<commit_message>
material is also added for orthotree figure
</commit_message>
<xml_diff>
--- a/paper/figure/material.pptx
+++ b/paper/figure/material.pptx
@@ -8,8 +8,8 @@
     <p:sldId id="256" r:id="rId2"/>
     <p:sldId id="257" r:id="rId3"/>
   </p:sldIdLst>
-  <p:sldSz cx="9144000" cy="6858000" type="screen4x3"/>
-  <p:notesSz cx="6858000" cy="9144000"/>
+  <p:sldSz cx="6858000" cy="9906000" type="A4"/>
+  <p:notesSz cx="6946900" cy="10058400"/>
   <p:defaultTextStyle>
     <a:defPPr>
       <a:defRPr lang="ja-JP"/>
@@ -137,8 +137,8 @@
         </p:nvSpPr>
         <p:spPr>
           <a:xfrm>
-            <a:off x="685800" y="2130425"/>
-            <a:ext cx="7772400" cy="1470025"/>
+            <a:off x="514350" y="3077284"/>
+            <a:ext cx="5829300" cy="2123369"/>
           </a:xfrm>
         </p:spPr>
         <p:txBody>
@@ -165,8 +165,8 @@
         </p:nvSpPr>
         <p:spPr>
           <a:xfrm>
-            <a:off x="1371600" y="3886200"/>
-            <a:ext cx="6400800" cy="1752600"/>
+            <a:off x="1028700" y="5613400"/>
+            <a:ext cx="4800600" cy="2531533"/>
           </a:xfrm>
         </p:spPr>
         <p:txBody>
@@ -571,8 +571,8 @@
         </p:nvSpPr>
         <p:spPr>
           <a:xfrm>
-            <a:off x="6629400" y="274638"/>
-            <a:ext cx="2057400" cy="5851525"/>
+            <a:off x="4972050" y="396702"/>
+            <a:ext cx="1543050" cy="8452202"/>
           </a:xfrm>
         </p:spPr>
         <p:txBody>
@@ -599,8 +599,8 @@
         </p:nvSpPr>
         <p:spPr>
           <a:xfrm>
-            <a:off x="457200" y="274638"/>
-            <a:ext cx="6019800" cy="5851525"/>
+            <a:off x="342900" y="396702"/>
+            <a:ext cx="4514850" cy="8452202"/>
           </a:xfrm>
         </p:spPr>
         <p:txBody>
@@ -975,8 +975,8 @@
         </p:nvSpPr>
         <p:spPr>
           <a:xfrm>
-            <a:off x="722313" y="4406900"/>
-            <a:ext cx="7772400" cy="1362075"/>
+            <a:off x="541735" y="6365522"/>
+            <a:ext cx="5829300" cy="1967442"/>
           </a:xfrm>
         </p:spPr>
         <p:txBody>
@@ -1007,8 +1007,8 @@
         </p:nvSpPr>
         <p:spPr>
           <a:xfrm>
-            <a:off x="722313" y="2906713"/>
-            <a:ext cx="7772400" cy="1500187"/>
+            <a:off x="541735" y="4198589"/>
+            <a:ext cx="5829300" cy="2166936"/>
           </a:xfrm>
         </p:spPr>
         <p:txBody>
@@ -1239,8 +1239,8 @@
         </p:nvSpPr>
         <p:spPr>
           <a:xfrm>
-            <a:off x="457200" y="1600200"/>
-            <a:ext cx="4038600" cy="4525963"/>
+            <a:off x="342900" y="2311403"/>
+            <a:ext cx="3028950" cy="6537502"/>
           </a:xfrm>
         </p:spPr>
         <p:txBody>
@@ -1356,8 +1356,8 @@
         </p:nvSpPr>
         <p:spPr>
           <a:xfrm>
-            <a:off x="4648200" y="1600200"/>
-            <a:ext cx="4038600" cy="4525963"/>
+            <a:off x="3486150" y="2311403"/>
+            <a:ext cx="3028950" cy="6537502"/>
           </a:xfrm>
         </p:spPr>
         <p:txBody>
@@ -1590,8 +1590,8 @@
         </p:nvSpPr>
         <p:spPr>
           <a:xfrm>
-            <a:off x="457200" y="1535113"/>
-            <a:ext cx="4040188" cy="639762"/>
+            <a:off x="342902" y="2217385"/>
+            <a:ext cx="3030141" cy="924101"/>
           </a:xfrm>
         </p:spPr>
         <p:txBody>
@@ -1655,8 +1655,8 @@
         </p:nvSpPr>
         <p:spPr>
           <a:xfrm>
-            <a:off x="457200" y="2174875"/>
-            <a:ext cx="4040188" cy="3951288"/>
+            <a:off x="342902" y="3141486"/>
+            <a:ext cx="3030141" cy="5707416"/>
           </a:xfrm>
         </p:spPr>
         <p:txBody>
@@ -1772,8 +1772,8 @@
         </p:nvSpPr>
         <p:spPr>
           <a:xfrm>
-            <a:off x="4645025" y="1535113"/>
-            <a:ext cx="4041775" cy="639762"/>
+            <a:off x="3483771" y="2217385"/>
+            <a:ext cx="3031331" cy="924101"/>
           </a:xfrm>
         </p:spPr>
         <p:txBody>
@@ -1837,8 +1837,8 @@
         </p:nvSpPr>
         <p:spPr>
           <a:xfrm>
-            <a:off x="4645025" y="2174875"/>
-            <a:ext cx="4041775" cy="3951288"/>
+            <a:off x="3483771" y="3141486"/>
+            <a:ext cx="3031331" cy="5707416"/>
           </a:xfrm>
         </p:spPr>
         <p:txBody>
@@ -2247,8 +2247,8 @@
         </p:nvSpPr>
         <p:spPr>
           <a:xfrm>
-            <a:off x="457200" y="273050"/>
-            <a:ext cx="3008313" cy="1162050"/>
+            <a:off x="342902" y="394406"/>
+            <a:ext cx="2256235" cy="1678517"/>
           </a:xfrm>
         </p:spPr>
         <p:txBody>
@@ -2279,8 +2279,8 @@
         </p:nvSpPr>
         <p:spPr>
           <a:xfrm>
-            <a:off x="3575050" y="273050"/>
-            <a:ext cx="5111750" cy="5853113"/>
+            <a:off x="2681289" y="394409"/>
+            <a:ext cx="3833813" cy="8454497"/>
           </a:xfrm>
         </p:spPr>
         <p:txBody>
@@ -2396,8 +2396,8 @@
         </p:nvSpPr>
         <p:spPr>
           <a:xfrm>
-            <a:off x="457200" y="1435100"/>
-            <a:ext cx="3008313" cy="4691063"/>
+            <a:off x="342902" y="2072925"/>
+            <a:ext cx="2256235" cy="6775980"/>
           </a:xfrm>
         </p:spPr>
         <p:txBody>
@@ -2551,8 +2551,8 @@
         </p:nvSpPr>
         <p:spPr>
           <a:xfrm>
-            <a:off x="1792288" y="4800600"/>
-            <a:ext cx="5486400" cy="566738"/>
+            <a:off x="1344216" y="6934202"/>
+            <a:ext cx="4114800" cy="818622"/>
           </a:xfrm>
         </p:spPr>
         <p:txBody>
@@ -2583,8 +2583,8 @@
         </p:nvSpPr>
         <p:spPr>
           <a:xfrm>
-            <a:off x="1792288" y="612775"/>
-            <a:ext cx="5486400" cy="4114800"/>
+            <a:off x="1344216" y="885119"/>
+            <a:ext cx="4114800" cy="5943600"/>
           </a:xfrm>
         </p:spPr>
         <p:txBody>
@@ -2644,8 +2644,8 @@
         </p:nvSpPr>
         <p:spPr>
           <a:xfrm>
-            <a:off x="1792288" y="5367338"/>
-            <a:ext cx="5486400" cy="804862"/>
+            <a:off x="1344216" y="7752824"/>
+            <a:ext cx="4114800" cy="1162578"/>
           </a:xfrm>
         </p:spPr>
         <p:txBody>
@@ -2804,8 +2804,8 @@
         </p:nvSpPr>
         <p:spPr>
           <a:xfrm>
-            <a:off x="457200" y="274638"/>
-            <a:ext cx="8229600" cy="1143000"/>
+            <a:off x="342900" y="396699"/>
+            <a:ext cx="6172200" cy="1651000"/>
           </a:xfrm>
           <a:prstGeom prst="rect">
             <a:avLst/>
@@ -2837,8 +2837,8 @@
         </p:nvSpPr>
         <p:spPr>
           <a:xfrm>
-            <a:off x="457200" y="1600200"/>
-            <a:ext cx="8229600" cy="4525963"/>
+            <a:off x="342900" y="2311403"/>
+            <a:ext cx="6172200" cy="6537502"/>
           </a:xfrm>
           <a:prstGeom prst="rect">
             <a:avLst/>
@@ -2931,8 +2931,8 @@
         </p:nvSpPr>
         <p:spPr>
           <a:xfrm>
-            <a:off x="457200" y="6356350"/>
-            <a:ext cx="2133600" cy="365125"/>
+            <a:off x="342900" y="9181398"/>
+            <a:ext cx="1600200" cy="527402"/>
           </a:xfrm>
           <a:prstGeom prst="rect">
             <a:avLst/>
@@ -2972,8 +2972,8 @@
         </p:nvSpPr>
         <p:spPr>
           <a:xfrm>
-            <a:off x="3124200" y="6356350"/>
-            <a:ext cx="2895600" cy="365125"/>
+            <a:off x="2343150" y="9181398"/>
+            <a:ext cx="2171700" cy="527402"/>
           </a:xfrm>
           <a:prstGeom prst="rect">
             <a:avLst/>
@@ -3009,8 +3009,8 @@
         </p:nvSpPr>
         <p:spPr>
           <a:xfrm>
-            <a:off x="6553200" y="6356350"/>
-            <a:ext cx="2133600" cy="365125"/>
+            <a:off x="4914900" y="9181398"/>
+            <a:ext cx="1600200" cy="527402"/>
           </a:xfrm>
           <a:prstGeom prst="rect">
             <a:avLst/>
@@ -3326,39 +3326,809 @@
       </p:grpSpPr>
       <p:sp>
         <p:nvSpPr>
-          <p:cNvPr id="2" name="タイトル 1"/>
-          <p:cNvSpPr>
-            <a:spLocks noGrp="1"/>
-          </p:cNvSpPr>
-          <p:nvPr>
-            <p:ph type="ctrTitle"/>
-          </p:nvPr>
-        </p:nvSpPr>
-        <p:spPr/>
-        <p:txBody>
-          <a:bodyPr/>
-          <a:lstStyle/>
-          <a:p>
-            <a:endParaRPr kumimoji="1" lang="ja-JP" altLang="en-US"/>
-          </a:p>
-        </p:txBody>
-      </p:sp>
-      <p:sp>
-        <p:nvSpPr>
-          <p:cNvPr id="3" name="サブタイトル 2"/>
-          <p:cNvSpPr>
-            <a:spLocks noGrp="1"/>
-          </p:cNvSpPr>
-          <p:nvPr>
-            <p:ph type="subTitle" idx="1"/>
-          </p:nvPr>
-        </p:nvSpPr>
-        <p:spPr/>
-        <p:txBody>
-          <a:bodyPr/>
-          <a:lstStyle/>
-          <a:p>
-            <a:endParaRPr kumimoji="1" lang="ja-JP" altLang="en-US"/>
+          <p:cNvPr id="12" name="正方形/長方形 11"/>
+          <p:cNvSpPr/>
+          <p:nvPr/>
+        </p:nvSpPr>
+        <p:spPr>
+          <a:xfrm>
+            <a:off x="1412776" y="5457344"/>
+            <a:ext cx="2016224" cy="1584176"/>
+          </a:xfrm>
+          <a:prstGeom prst="rect">
+            <a:avLst/>
+          </a:prstGeom>
+          <a:noFill/>
+          <a:ln w="12700">
+            <a:solidFill>
+              <a:schemeClr val="tx1"/>
+            </a:solidFill>
+          </a:ln>
+        </p:spPr>
+        <p:style>
+          <a:lnRef idx="2">
+            <a:schemeClr val="accent1">
+              <a:shade val="50000"/>
+            </a:schemeClr>
+          </a:lnRef>
+          <a:fillRef idx="1">
+            <a:schemeClr val="accent1"/>
+          </a:fillRef>
+          <a:effectRef idx="0">
+            <a:schemeClr val="accent1"/>
+          </a:effectRef>
+          <a:fontRef idx="minor">
+            <a:schemeClr val="lt1"/>
+          </a:fontRef>
+        </p:style>
+        <p:txBody>
+          <a:bodyPr rtlCol="0" anchor="ctr"/>
+          <a:lstStyle/>
+          <a:p>
+            <a:pPr algn="ctr"/>
+            <a:endParaRPr kumimoji="1" lang="ja-JP" altLang="en-US"/>
+          </a:p>
+        </p:txBody>
+      </p:sp>
+      <p:sp>
+        <p:nvSpPr>
+          <p:cNvPr id="13" name="正方形/長方形 12"/>
+          <p:cNvSpPr/>
+          <p:nvPr/>
+        </p:nvSpPr>
+        <p:spPr>
+          <a:xfrm>
+            <a:off x="3573016" y="5457344"/>
+            <a:ext cx="2016224" cy="1584176"/>
+          </a:xfrm>
+          <a:prstGeom prst="rect">
+            <a:avLst/>
+          </a:prstGeom>
+          <a:noFill/>
+          <a:ln w="12700">
+            <a:solidFill>
+              <a:schemeClr val="tx1"/>
+            </a:solidFill>
+          </a:ln>
+        </p:spPr>
+        <p:style>
+          <a:lnRef idx="2">
+            <a:schemeClr val="accent1">
+              <a:shade val="50000"/>
+            </a:schemeClr>
+          </a:lnRef>
+          <a:fillRef idx="1">
+            <a:schemeClr val="accent1"/>
+          </a:fillRef>
+          <a:effectRef idx="0">
+            <a:schemeClr val="accent1"/>
+          </a:effectRef>
+          <a:fontRef idx="minor">
+            <a:schemeClr val="lt1"/>
+          </a:fontRef>
+        </p:style>
+        <p:txBody>
+          <a:bodyPr rtlCol="0" anchor="ctr"/>
+          <a:lstStyle/>
+          <a:p>
+            <a:pPr algn="ctr"/>
+            <a:endParaRPr kumimoji="1" lang="ja-JP" altLang="en-US"/>
+          </a:p>
+        </p:txBody>
+      </p:sp>
+      <p:sp>
+        <p:nvSpPr>
+          <p:cNvPr id="14" name="正方形/長方形 13"/>
+          <p:cNvSpPr/>
+          <p:nvPr/>
+        </p:nvSpPr>
+        <p:spPr>
+          <a:xfrm>
+            <a:off x="1412776" y="7185536"/>
+            <a:ext cx="1296144" cy="2448272"/>
+          </a:xfrm>
+          <a:prstGeom prst="rect">
+            <a:avLst/>
+          </a:prstGeom>
+          <a:noFill/>
+          <a:ln w="12700">
+            <a:solidFill>
+              <a:schemeClr val="tx1"/>
+            </a:solidFill>
+          </a:ln>
+        </p:spPr>
+        <p:style>
+          <a:lnRef idx="2">
+            <a:schemeClr val="accent1">
+              <a:shade val="50000"/>
+            </a:schemeClr>
+          </a:lnRef>
+          <a:fillRef idx="1">
+            <a:schemeClr val="accent1"/>
+          </a:fillRef>
+          <a:effectRef idx="0">
+            <a:schemeClr val="accent1"/>
+          </a:effectRef>
+          <a:fontRef idx="minor">
+            <a:schemeClr val="lt1"/>
+          </a:fontRef>
+        </p:style>
+        <p:txBody>
+          <a:bodyPr rtlCol="0" anchor="ctr"/>
+          <a:lstStyle/>
+          <a:p>
+            <a:pPr algn="ctr"/>
+            <a:endParaRPr kumimoji="1" lang="ja-JP" altLang="en-US"/>
+          </a:p>
+        </p:txBody>
+      </p:sp>
+      <p:sp>
+        <p:nvSpPr>
+          <p:cNvPr id="15" name="正方形/長方形 14"/>
+          <p:cNvSpPr/>
+          <p:nvPr/>
+        </p:nvSpPr>
+        <p:spPr>
+          <a:xfrm>
+            <a:off x="2924944" y="7257544"/>
+            <a:ext cx="1224136" cy="2304256"/>
+          </a:xfrm>
+          <a:prstGeom prst="rect">
+            <a:avLst/>
+          </a:prstGeom>
+          <a:noFill/>
+          <a:ln w="12700">
+            <a:solidFill>
+              <a:schemeClr val="tx1"/>
+            </a:solidFill>
+          </a:ln>
+        </p:spPr>
+        <p:style>
+          <a:lnRef idx="2">
+            <a:schemeClr val="accent1">
+              <a:shade val="50000"/>
+            </a:schemeClr>
+          </a:lnRef>
+          <a:fillRef idx="1">
+            <a:schemeClr val="accent1"/>
+          </a:fillRef>
+          <a:effectRef idx="0">
+            <a:schemeClr val="accent1"/>
+          </a:effectRef>
+          <a:fontRef idx="minor">
+            <a:schemeClr val="lt1"/>
+          </a:fontRef>
+        </p:style>
+        <p:txBody>
+          <a:bodyPr rtlCol="0" anchor="ctr"/>
+          <a:lstStyle/>
+          <a:p>
+            <a:pPr algn="ctr"/>
+            <a:endParaRPr kumimoji="1" lang="ja-JP" altLang="en-US"/>
+          </a:p>
+        </p:txBody>
+      </p:sp>
+      <p:sp>
+        <p:nvSpPr>
+          <p:cNvPr id="16" name="正方形/長方形 15"/>
+          <p:cNvSpPr/>
+          <p:nvPr/>
+        </p:nvSpPr>
+        <p:spPr>
+          <a:xfrm>
+            <a:off x="4293096" y="7257544"/>
+            <a:ext cx="1224136" cy="2304256"/>
+          </a:xfrm>
+          <a:prstGeom prst="rect">
+            <a:avLst/>
+          </a:prstGeom>
+          <a:noFill/>
+          <a:ln w="12700">
+            <a:solidFill>
+              <a:schemeClr val="tx1"/>
+            </a:solidFill>
+          </a:ln>
+        </p:spPr>
+        <p:style>
+          <a:lnRef idx="2">
+            <a:schemeClr val="accent1">
+              <a:shade val="50000"/>
+            </a:schemeClr>
+          </a:lnRef>
+          <a:fillRef idx="1">
+            <a:schemeClr val="accent1"/>
+          </a:fillRef>
+          <a:effectRef idx="0">
+            <a:schemeClr val="accent1"/>
+          </a:effectRef>
+          <a:fontRef idx="minor">
+            <a:schemeClr val="lt1"/>
+          </a:fontRef>
+        </p:style>
+        <p:txBody>
+          <a:bodyPr rtlCol="0" anchor="ctr"/>
+          <a:lstStyle/>
+          <a:p>
+            <a:pPr algn="ctr"/>
+            <a:endParaRPr kumimoji="1" lang="ja-JP" altLang="en-US"/>
+          </a:p>
+        </p:txBody>
+      </p:sp>
+      <p:sp>
+        <p:nvSpPr>
+          <p:cNvPr id="17" name="正方形/長方形 16"/>
+          <p:cNvSpPr/>
+          <p:nvPr/>
+        </p:nvSpPr>
+        <p:spPr>
+          <a:xfrm>
+            <a:off x="1341008" y="632520"/>
+            <a:ext cx="2160000" cy="1737580"/>
+          </a:xfrm>
+          <a:prstGeom prst="rect">
+            <a:avLst/>
+          </a:prstGeom>
+          <a:noFill/>
+          <a:ln w="57150">
+            <a:solidFill>
+              <a:schemeClr val="tx1"/>
+            </a:solidFill>
+          </a:ln>
+        </p:spPr>
+        <p:style>
+          <a:lnRef idx="2">
+            <a:schemeClr val="accent1">
+              <a:shade val="50000"/>
+            </a:schemeClr>
+          </a:lnRef>
+          <a:fillRef idx="1">
+            <a:schemeClr val="accent1"/>
+          </a:fillRef>
+          <a:effectRef idx="0">
+            <a:schemeClr val="accent1"/>
+          </a:effectRef>
+          <a:fontRef idx="minor">
+            <a:schemeClr val="lt1"/>
+          </a:fontRef>
+        </p:style>
+        <p:txBody>
+          <a:bodyPr rtlCol="0" anchor="ctr"/>
+          <a:lstStyle/>
+          <a:p>
+            <a:pPr algn="ctr"/>
+            <a:endParaRPr kumimoji="1" lang="ja-JP" altLang="en-US"/>
+          </a:p>
+        </p:txBody>
+      </p:sp>
+      <p:sp>
+        <p:nvSpPr>
+          <p:cNvPr id="18" name="正方形/長方形 17"/>
+          <p:cNvSpPr/>
+          <p:nvPr/>
+        </p:nvSpPr>
+        <p:spPr>
+          <a:xfrm>
+            <a:off x="3501248" y="632520"/>
+            <a:ext cx="2160000" cy="1737388"/>
+          </a:xfrm>
+          <a:prstGeom prst="rect">
+            <a:avLst/>
+          </a:prstGeom>
+          <a:noFill/>
+          <a:ln w="57150">
+            <a:solidFill>
+              <a:schemeClr val="tx1"/>
+            </a:solidFill>
+          </a:ln>
+        </p:spPr>
+        <p:style>
+          <a:lnRef idx="2">
+            <a:schemeClr val="accent1">
+              <a:shade val="50000"/>
+            </a:schemeClr>
+          </a:lnRef>
+          <a:fillRef idx="1">
+            <a:schemeClr val="accent1"/>
+          </a:fillRef>
+          <a:effectRef idx="0">
+            <a:schemeClr val="accent1"/>
+          </a:effectRef>
+          <a:fontRef idx="minor">
+            <a:schemeClr val="lt1"/>
+          </a:fontRef>
+        </p:style>
+        <p:txBody>
+          <a:bodyPr rtlCol="0" anchor="ctr"/>
+          <a:lstStyle/>
+          <a:p>
+            <a:pPr algn="ctr"/>
+            <a:endParaRPr kumimoji="1" lang="ja-JP" altLang="en-US"/>
+          </a:p>
+        </p:txBody>
+      </p:sp>
+      <p:sp>
+        <p:nvSpPr>
+          <p:cNvPr id="19" name="正方形/長方形 18"/>
+          <p:cNvSpPr/>
+          <p:nvPr/>
+        </p:nvSpPr>
+        <p:spPr>
+          <a:xfrm>
+            <a:off x="1340768" y="2370292"/>
+            <a:ext cx="1440000" cy="2592000"/>
+          </a:xfrm>
+          <a:prstGeom prst="rect">
+            <a:avLst/>
+          </a:prstGeom>
+          <a:noFill/>
+          <a:ln w="57150">
+            <a:solidFill>
+              <a:schemeClr val="tx1"/>
+            </a:solidFill>
+          </a:ln>
+        </p:spPr>
+        <p:style>
+          <a:lnRef idx="2">
+            <a:schemeClr val="accent1">
+              <a:shade val="50000"/>
+            </a:schemeClr>
+          </a:lnRef>
+          <a:fillRef idx="1">
+            <a:schemeClr val="accent1"/>
+          </a:fillRef>
+          <a:effectRef idx="0">
+            <a:schemeClr val="accent1"/>
+          </a:effectRef>
+          <a:fontRef idx="minor">
+            <a:schemeClr val="lt1"/>
+          </a:fontRef>
+        </p:style>
+        <p:txBody>
+          <a:bodyPr rtlCol="0" anchor="ctr"/>
+          <a:lstStyle/>
+          <a:p>
+            <a:pPr algn="ctr"/>
+            <a:endParaRPr kumimoji="1" lang="ja-JP" altLang="en-US"/>
+          </a:p>
+        </p:txBody>
+      </p:sp>
+      <p:sp>
+        <p:nvSpPr>
+          <p:cNvPr id="20" name="正方形/長方形 19"/>
+          <p:cNvSpPr/>
+          <p:nvPr/>
+        </p:nvSpPr>
+        <p:spPr>
+          <a:xfrm>
+            <a:off x="2781088" y="2370100"/>
+            <a:ext cx="1440000" cy="2592000"/>
+          </a:xfrm>
+          <a:prstGeom prst="rect">
+            <a:avLst/>
+          </a:prstGeom>
+          <a:noFill/>
+          <a:ln w="57150">
+            <a:solidFill>
+              <a:schemeClr val="tx1"/>
+            </a:solidFill>
+          </a:ln>
+        </p:spPr>
+        <p:style>
+          <a:lnRef idx="2">
+            <a:schemeClr val="accent1">
+              <a:shade val="50000"/>
+            </a:schemeClr>
+          </a:lnRef>
+          <a:fillRef idx="1">
+            <a:schemeClr val="accent1"/>
+          </a:fillRef>
+          <a:effectRef idx="0">
+            <a:schemeClr val="accent1"/>
+          </a:effectRef>
+          <a:fontRef idx="minor">
+            <a:schemeClr val="lt1"/>
+          </a:fontRef>
+        </p:style>
+        <p:txBody>
+          <a:bodyPr rtlCol="0" anchor="ctr"/>
+          <a:lstStyle/>
+          <a:p>
+            <a:pPr algn="ctr"/>
+            <a:endParaRPr kumimoji="1" lang="ja-JP" altLang="en-US"/>
+          </a:p>
+        </p:txBody>
+      </p:sp>
+      <p:sp>
+        <p:nvSpPr>
+          <p:cNvPr id="21" name="正方形/長方形 20"/>
+          <p:cNvSpPr/>
+          <p:nvPr/>
+        </p:nvSpPr>
+        <p:spPr>
+          <a:xfrm>
+            <a:off x="4221248" y="2370100"/>
+            <a:ext cx="1440000" cy="2592000"/>
+          </a:xfrm>
+          <a:prstGeom prst="rect">
+            <a:avLst/>
+          </a:prstGeom>
+          <a:noFill/>
+          <a:ln w="57150">
+            <a:solidFill>
+              <a:schemeClr val="tx1"/>
+            </a:solidFill>
+          </a:ln>
+        </p:spPr>
+        <p:style>
+          <a:lnRef idx="2">
+            <a:schemeClr val="accent1">
+              <a:shade val="50000"/>
+            </a:schemeClr>
+          </a:lnRef>
+          <a:fillRef idx="1">
+            <a:schemeClr val="accent1"/>
+          </a:fillRef>
+          <a:effectRef idx="0">
+            <a:schemeClr val="accent1"/>
+          </a:effectRef>
+          <a:fontRef idx="minor">
+            <a:schemeClr val="lt1"/>
+          </a:fontRef>
+        </p:style>
+        <p:txBody>
+          <a:bodyPr rtlCol="0" anchor="ctr"/>
+          <a:lstStyle/>
+          <a:p>
+            <a:pPr algn="ctr"/>
+            <a:endParaRPr kumimoji="1" lang="ja-JP" altLang="en-US"/>
+          </a:p>
+        </p:txBody>
+      </p:sp>
+      <p:sp>
+        <p:nvSpPr>
+          <p:cNvPr id="22" name="正方形/長方形 21"/>
+          <p:cNvSpPr/>
+          <p:nvPr/>
+        </p:nvSpPr>
+        <p:spPr>
+          <a:xfrm>
+            <a:off x="1341008" y="5385336"/>
+            <a:ext cx="4320240" cy="1728000"/>
+          </a:xfrm>
+          <a:prstGeom prst="rect">
+            <a:avLst/>
+          </a:prstGeom>
+          <a:noFill/>
+          <a:ln w="12700">
+            <a:solidFill>
+              <a:schemeClr val="tx1"/>
+            </a:solidFill>
+          </a:ln>
+        </p:spPr>
+        <p:style>
+          <a:lnRef idx="2">
+            <a:schemeClr val="accent1">
+              <a:shade val="50000"/>
+            </a:schemeClr>
+          </a:lnRef>
+          <a:fillRef idx="1">
+            <a:schemeClr val="accent1"/>
+          </a:fillRef>
+          <a:effectRef idx="0">
+            <a:schemeClr val="accent1"/>
+          </a:effectRef>
+          <a:fontRef idx="minor">
+            <a:schemeClr val="lt1"/>
+          </a:fontRef>
+        </p:style>
+        <p:txBody>
+          <a:bodyPr rtlCol="0" anchor="ctr"/>
+          <a:lstStyle/>
+          <a:p>
+            <a:pPr algn="ctr"/>
+            <a:endParaRPr kumimoji="1" lang="ja-JP" altLang="en-US"/>
+          </a:p>
+        </p:txBody>
+      </p:sp>
+      <p:sp>
+        <p:nvSpPr>
+          <p:cNvPr id="23" name="正方形/長方形 22"/>
+          <p:cNvSpPr/>
+          <p:nvPr/>
+        </p:nvSpPr>
+        <p:spPr>
+          <a:xfrm>
+            <a:off x="1340768" y="7113528"/>
+            <a:ext cx="4320480" cy="2592000"/>
+          </a:xfrm>
+          <a:prstGeom prst="rect">
+            <a:avLst/>
+          </a:prstGeom>
+          <a:noFill/>
+          <a:ln w="12700">
+            <a:solidFill>
+              <a:schemeClr val="tx1"/>
+            </a:solidFill>
+          </a:ln>
+        </p:spPr>
+        <p:style>
+          <a:lnRef idx="2">
+            <a:schemeClr val="accent1">
+              <a:shade val="50000"/>
+            </a:schemeClr>
+          </a:lnRef>
+          <a:fillRef idx="1">
+            <a:schemeClr val="accent1"/>
+          </a:fillRef>
+          <a:effectRef idx="0">
+            <a:schemeClr val="accent1"/>
+          </a:effectRef>
+          <a:fontRef idx="minor">
+            <a:schemeClr val="lt1"/>
+          </a:fontRef>
+        </p:style>
+        <p:txBody>
+          <a:bodyPr rtlCol="0" anchor="ctr"/>
+          <a:lstStyle/>
+          <a:p>
+            <a:pPr algn="ctr"/>
+            <a:endParaRPr kumimoji="1" lang="ja-JP" altLang="en-US"/>
+          </a:p>
+        </p:txBody>
+      </p:sp>
+      <p:sp>
+        <p:nvSpPr>
+          <p:cNvPr id="24" name="正方形/長方形 23"/>
+          <p:cNvSpPr/>
+          <p:nvPr/>
+        </p:nvSpPr>
+        <p:spPr>
+          <a:xfrm>
+            <a:off x="2852936" y="7185536"/>
+            <a:ext cx="2736304" cy="2448272"/>
+          </a:xfrm>
+          <a:prstGeom prst="rect">
+            <a:avLst/>
+          </a:prstGeom>
+          <a:noFill/>
+          <a:ln w="12700">
+            <a:solidFill>
+              <a:schemeClr val="tx1"/>
+            </a:solidFill>
+          </a:ln>
+        </p:spPr>
+        <p:style>
+          <a:lnRef idx="2">
+            <a:schemeClr val="accent1">
+              <a:shade val="50000"/>
+            </a:schemeClr>
+          </a:lnRef>
+          <a:fillRef idx="1">
+            <a:schemeClr val="accent1"/>
+          </a:fillRef>
+          <a:effectRef idx="0">
+            <a:schemeClr val="accent1"/>
+          </a:effectRef>
+          <a:fontRef idx="minor">
+            <a:schemeClr val="lt1"/>
+          </a:fontRef>
+        </p:style>
+        <p:txBody>
+          <a:bodyPr rtlCol="0" anchor="ctr"/>
+          <a:lstStyle/>
+          <a:p>
+            <a:pPr algn="ctr"/>
+            <a:endParaRPr kumimoji="1" lang="ja-JP" altLang="en-US"/>
+          </a:p>
+        </p:txBody>
+      </p:sp>
+      <p:sp>
+        <p:nvSpPr>
+          <p:cNvPr id="25" name="テキスト ボックス 24"/>
+          <p:cNvSpPr txBox="1"/>
+          <p:nvPr/>
+        </p:nvSpPr>
+        <p:spPr>
+          <a:xfrm>
+            <a:off x="1196752" y="263188"/>
+            <a:ext cx="301686" cy="369332"/>
+          </a:xfrm>
+          <a:prstGeom prst="rect">
+            <a:avLst/>
+          </a:prstGeom>
+          <a:noFill/>
+        </p:spPr>
+        <p:txBody>
+          <a:bodyPr wrap="none" rtlCol="0">
+            <a:spAutoFit/>
+          </a:bodyPr>
+          <a:lstStyle/>
+          <a:p>
+            <a:r>
+              <a:rPr kumimoji="1" lang="en-US" altLang="ja-JP" dirty="0" smtClean="0"/>
+              <a:t>0</a:t>
+            </a:r>
+            <a:endParaRPr kumimoji="1" lang="ja-JP" altLang="en-US" dirty="0"/>
+          </a:p>
+        </p:txBody>
+      </p:sp>
+      <p:sp>
+        <p:nvSpPr>
+          <p:cNvPr id="26" name="テキスト ボックス 25"/>
+          <p:cNvSpPr txBox="1"/>
+          <p:nvPr/>
+        </p:nvSpPr>
+        <p:spPr>
+          <a:xfrm>
+            <a:off x="2564904" y="253896"/>
+            <a:ext cx="418704" cy="369332"/>
+          </a:xfrm>
+          <a:prstGeom prst="rect">
+            <a:avLst/>
+          </a:prstGeom>
+          <a:noFill/>
+        </p:spPr>
+        <p:txBody>
+          <a:bodyPr wrap="none" rtlCol="0">
+            <a:spAutoFit/>
+          </a:bodyPr>
+          <a:lstStyle/>
+          <a:p>
+            <a:r>
+              <a:rPr kumimoji="1" lang="en-US" altLang="ja-JP" dirty="0" smtClean="0"/>
+              <a:t>20</a:t>
+            </a:r>
+            <a:endParaRPr kumimoji="1" lang="ja-JP" altLang="en-US" dirty="0"/>
+          </a:p>
+        </p:txBody>
+      </p:sp>
+      <p:sp>
+        <p:nvSpPr>
+          <p:cNvPr id="27" name="テキスト ボックス 26"/>
+          <p:cNvSpPr txBox="1"/>
+          <p:nvPr/>
+        </p:nvSpPr>
+        <p:spPr>
+          <a:xfrm>
+            <a:off x="4018408" y="263188"/>
+            <a:ext cx="418704" cy="369332"/>
+          </a:xfrm>
+          <a:prstGeom prst="rect">
+            <a:avLst/>
+          </a:prstGeom>
+          <a:noFill/>
+        </p:spPr>
+        <p:txBody>
+          <a:bodyPr wrap="none" rtlCol="0">
+            <a:spAutoFit/>
+          </a:bodyPr>
+          <a:lstStyle/>
+          <a:p>
+            <a:r>
+              <a:rPr kumimoji="1" lang="en-US" altLang="ja-JP" dirty="0" smtClean="0"/>
+              <a:t>40</a:t>
+            </a:r>
+            <a:endParaRPr kumimoji="1" lang="ja-JP" altLang="en-US" dirty="0"/>
+          </a:p>
+        </p:txBody>
+      </p:sp>
+      <p:sp>
+        <p:nvSpPr>
+          <p:cNvPr id="28" name="テキスト ボックス 27"/>
+          <p:cNvSpPr txBox="1"/>
+          <p:nvPr/>
+        </p:nvSpPr>
+        <p:spPr>
+          <a:xfrm>
+            <a:off x="5458568" y="263188"/>
+            <a:ext cx="418704" cy="369332"/>
+          </a:xfrm>
+          <a:prstGeom prst="rect">
+            <a:avLst/>
+          </a:prstGeom>
+          <a:noFill/>
+        </p:spPr>
+        <p:txBody>
+          <a:bodyPr wrap="none" rtlCol="0">
+            <a:spAutoFit/>
+          </a:bodyPr>
+          <a:lstStyle/>
+          <a:p>
+            <a:r>
+              <a:rPr kumimoji="1" lang="en-US" altLang="ja-JP" dirty="0" smtClean="0"/>
+              <a:t>60</a:t>
+            </a:r>
+            <a:endParaRPr kumimoji="1" lang="ja-JP" altLang="en-US" dirty="0"/>
+          </a:p>
+        </p:txBody>
+      </p:sp>
+      <p:sp>
+        <p:nvSpPr>
+          <p:cNvPr id="29" name="テキスト ボックス 28"/>
+          <p:cNvSpPr txBox="1"/>
+          <p:nvPr/>
+        </p:nvSpPr>
+        <p:spPr>
+          <a:xfrm>
+            <a:off x="908720" y="2153980"/>
+            <a:ext cx="418704" cy="369332"/>
+          </a:xfrm>
+          <a:prstGeom prst="rect">
+            <a:avLst/>
+          </a:prstGeom>
+          <a:noFill/>
+        </p:spPr>
+        <p:txBody>
+          <a:bodyPr wrap="none" rtlCol="0">
+            <a:spAutoFit/>
+          </a:bodyPr>
+          <a:lstStyle/>
+          <a:p>
+            <a:r>
+              <a:rPr kumimoji="1" lang="en-US" altLang="ja-JP" dirty="0" smtClean="0"/>
+              <a:t>24</a:t>
+            </a:r>
+            <a:endParaRPr kumimoji="1" lang="ja-JP" altLang="en-US" dirty="0"/>
+          </a:p>
+        </p:txBody>
+      </p:sp>
+      <p:sp>
+        <p:nvSpPr>
+          <p:cNvPr id="30" name="テキスト ボックス 29"/>
+          <p:cNvSpPr txBox="1"/>
+          <p:nvPr/>
+        </p:nvSpPr>
+        <p:spPr>
+          <a:xfrm>
+            <a:off x="922064" y="4727684"/>
+            <a:ext cx="418704" cy="369332"/>
+          </a:xfrm>
+          <a:prstGeom prst="rect">
+            <a:avLst/>
+          </a:prstGeom>
+          <a:noFill/>
+        </p:spPr>
+        <p:txBody>
+          <a:bodyPr wrap="none" rtlCol="0">
+            <a:spAutoFit/>
+          </a:bodyPr>
+          <a:lstStyle/>
+          <a:p>
+            <a:r>
+              <a:rPr kumimoji="1" lang="en-US" altLang="ja-JP" dirty="0" smtClean="0"/>
+              <a:t>60</a:t>
+            </a:r>
+            <a:endParaRPr kumimoji="1" lang="ja-JP" altLang="en-US" dirty="0"/>
+          </a:p>
+        </p:txBody>
+      </p:sp>
+      <p:sp>
+        <p:nvSpPr>
+          <p:cNvPr id="31" name="テキスト ボックス 30"/>
+          <p:cNvSpPr txBox="1"/>
+          <p:nvPr/>
+        </p:nvSpPr>
+        <p:spPr>
+          <a:xfrm>
+            <a:off x="3298328" y="272480"/>
+            <a:ext cx="418704" cy="369332"/>
+          </a:xfrm>
+          <a:prstGeom prst="rect">
+            <a:avLst/>
+          </a:prstGeom>
+          <a:noFill/>
+        </p:spPr>
+        <p:txBody>
+          <a:bodyPr wrap="none" rtlCol="0">
+            <a:spAutoFit/>
+          </a:bodyPr>
+          <a:lstStyle/>
+          <a:p>
+            <a:r>
+              <a:rPr kumimoji="1" lang="en-US" altLang="ja-JP" dirty="0" smtClean="0"/>
+              <a:t>30</a:t>
+            </a:r>
+            <a:endParaRPr kumimoji="1" lang="ja-JP" altLang="en-US" dirty="0"/>
           </a:p>
         </p:txBody>
       </p:sp>
@@ -3389,13 +4159,13 @@
       </p:grpSpPr>
       <p:sp>
         <p:nvSpPr>
-          <p:cNvPr id="2" name="正方形/長方形 1"/>
+          <p:cNvPr id="57" name="正方形/長方形 56"/>
           <p:cNvSpPr/>
           <p:nvPr/>
         </p:nvSpPr>
         <p:spPr>
           <a:xfrm>
-            <a:off x="3419872" y="2348880"/>
+            <a:off x="2348880" y="5745088"/>
             <a:ext cx="1728192" cy="1728192"/>
           </a:xfrm>
           <a:prstGeom prst="rect">
@@ -3472,13 +4242,13 @@
       </p:sp>
       <p:sp>
         <p:nvSpPr>
-          <p:cNvPr id="11" name="正方形/長方形 10"/>
+          <p:cNvPr id="58" name="正方形/長方形 57"/>
           <p:cNvSpPr/>
           <p:nvPr/>
         </p:nvSpPr>
         <p:spPr>
           <a:xfrm>
-            <a:off x="5148064" y="2348880"/>
+            <a:off x="4077072" y="5745088"/>
             <a:ext cx="1728192" cy="1728192"/>
           </a:xfrm>
           <a:prstGeom prst="rect">
@@ -3555,13 +4325,13 @@
       </p:sp>
       <p:sp>
         <p:nvSpPr>
-          <p:cNvPr id="12" name="正方形/長方形 11"/>
+          <p:cNvPr id="59" name="正方形/長方形 58"/>
           <p:cNvSpPr/>
           <p:nvPr/>
         </p:nvSpPr>
         <p:spPr>
           <a:xfrm>
-            <a:off x="1691680" y="2348880"/>
+            <a:off x="620688" y="5745088"/>
             <a:ext cx="1728192" cy="1728192"/>
           </a:xfrm>
           <a:prstGeom prst="rect">
@@ -3638,13 +4408,13 @@
       </p:sp>
       <p:sp>
         <p:nvSpPr>
-          <p:cNvPr id="16" name="正方形/長方形 15"/>
+          <p:cNvPr id="60" name="正方形/長方形 59"/>
           <p:cNvSpPr/>
           <p:nvPr/>
         </p:nvSpPr>
         <p:spPr>
           <a:xfrm>
-            <a:off x="3419872" y="4077072"/>
+            <a:off x="2348880" y="7473280"/>
             <a:ext cx="1728192" cy="1728192"/>
           </a:xfrm>
           <a:prstGeom prst="rect">
@@ -3721,13 +4491,13 @@
       </p:sp>
       <p:sp>
         <p:nvSpPr>
-          <p:cNvPr id="17" name="正方形/長方形 16"/>
+          <p:cNvPr id="61" name="正方形/長方形 60"/>
           <p:cNvSpPr/>
           <p:nvPr/>
         </p:nvSpPr>
         <p:spPr>
           <a:xfrm>
-            <a:off x="5148064" y="4077072"/>
+            <a:off x="4077072" y="7473280"/>
             <a:ext cx="1728192" cy="1728192"/>
           </a:xfrm>
           <a:prstGeom prst="rect">
@@ -3804,13 +4574,13 @@
       </p:sp>
       <p:sp>
         <p:nvSpPr>
-          <p:cNvPr id="18" name="正方形/長方形 17"/>
+          <p:cNvPr id="62" name="正方形/長方形 61"/>
           <p:cNvSpPr/>
           <p:nvPr/>
         </p:nvSpPr>
         <p:spPr>
           <a:xfrm>
-            <a:off x="1691680" y="4077072"/>
+            <a:off x="620688" y="7473280"/>
             <a:ext cx="1728192" cy="1728192"/>
           </a:xfrm>
           <a:prstGeom prst="rect">
@@ -3887,13 +4657,13 @@
       </p:sp>
       <p:sp>
         <p:nvSpPr>
-          <p:cNvPr id="19" name="正方形/長方形 18"/>
+          <p:cNvPr id="63" name="正方形/長方形 62"/>
           <p:cNvSpPr/>
           <p:nvPr/>
         </p:nvSpPr>
         <p:spPr>
           <a:xfrm>
-            <a:off x="3419872" y="620688"/>
+            <a:off x="2348880" y="4016896"/>
             <a:ext cx="1728192" cy="1728192"/>
           </a:xfrm>
           <a:prstGeom prst="rect">
@@ -3970,13 +4740,13 @@
       </p:sp>
       <p:sp>
         <p:nvSpPr>
-          <p:cNvPr id="20" name="正方形/長方形 19"/>
+          <p:cNvPr id="64" name="正方形/長方形 63"/>
           <p:cNvSpPr/>
           <p:nvPr/>
         </p:nvSpPr>
         <p:spPr>
           <a:xfrm>
-            <a:off x="5148064" y="620688"/>
+            <a:off x="4077072" y="4016896"/>
             <a:ext cx="1728192" cy="1728192"/>
           </a:xfrm>
           <a:prstGeom prst="rect">
@@ -4053,13 +4823,13 @@
       </p:sp>
       <p:sp>
         <p:nvSpPr>
-          <p:cNvPr id="21" name="正方形/長方形 20"/>
+          <p:cNvPr id="65" name="正方形/長方形 64"/>
           <p:cNvSpPr/>
           <p:nvPr/>
         </p:nvSpPr>
         <p:spPr>
           <a:xfrm>
-            <a:off x="1691680" y="620688"/>
+            <a:off x="620688" y="4016896"/>
             <a:ext cx="1728192" cy="1728192"/>
           </a:xfrm>
           <a:prstGeom prst="rect">
@@ -4136,13 +4906,13 @@
       </p:sp>
       <p:sp>
         <p:nvSpPr>
-          <p:cNvPr id="24" name="右矢印 23"/>
+          <p:cNvPr id="66" name="右矢印 65"/>
           <p:cNvSpPr/>
           <p:nvPr/>
         </p:nvSpPr>
         <p:spPr>
           <a:xfrm rot="5400000">
-            <a:off x="3887924" y="2096852"/>
+            <a:off x="2816933" y="5493060"/>
             <a:ext cx="720080" cy="504056"/>
           </a:xfrm>
           <a:prstGeom prst="rightArrow">
@@ -4179,13 +4949,13 @@
       </p:sp>
       <p:sp>
         <p:nvSpPr>
-          <p:cNvPr id="25" name="右矢印 24"/>
+          <p:cNvPr id="67" name="右矢印 66"/>
           <p:cNvSpPr/>
           <p:nvPr/>
         </p:nvSpPr>
         <p:spPr>
           <a:xfrm rot="5400000">
-            <a:off x="3887924" y="3825044"/>
+            <a:off x="2816933" y="7221252"/>
             <a:ext cx="720080" cy="504056"/>
           </a:xfrm>
           <a:prstGeom prst="rightArrow">
@@ -4222,13 +4992,13 @@
       </p:sp>
       <p:sp>
         <p:nvSpPr>
-          <p:cNvPr id="26" name="正方形/長方形 25"/>
+          <p:cNvPr id="68" name="正方形/長方形 67"/>
           <p:cNvSpPr/>
           <p:nvPr/>
         </p:nvSpPr>
         <p:spPr>
           <a:xfrm>
-            <a:off x="4408964" y="1844824"/>
+            <a:off x="3337972" y="5241032"/>
             <a:ext cx="1531188" cy="338554"/>
           </a:xfrm>
           <a:prstGeom prst="rect">
@@ -4272,13 +5042,13 @@
       </p:sp>
       <p:sp>
         <p:nvSpPr>
-          <p:cNvPr id="27" name="正方形/長方形 26"/>
+          <p:cNvPr id="69" name="正方形/長方形 68"/>
           <p:cNvSpPr/>
           <p:nvPr/>
         </p:nvSpPr>
         <p:spPr>
           <a:xfrm>
-            <a:off x="4544583" y="4170566"/>
+            <a:off x="3473593" y="7566774"/>
             <a:ext cx="1755609" cy="338554"/>
           </a:xfrm>
           <a:prstGeom prst="rect">
@@ -4322,13 +5092,13 @@
       </p:sp>
       <p:sp>
         <p:nvSpPr>
-          <p:cNvPr id="28" name="正方形/長方形 27"/>
+          <p:cNvPr id="70" name="正方形/長方形 69"/>
           <p:cNvSpPr/>
           <p:nvPr/>
         </p:nvSpPr>
         <p:spPr>
           <a:xfrm>
-            <a:off x="4644008" y="3356992"/>
+            <a:off x="3573017" y="6753200"/>
             <a:ext cx="1755609" cy="338554"/>
           </a:xfrm>
           <a:prstGeom prst="rect">
@@ -4363,13 +5133,13 @@
       </p:sp>
       <p:sp>
         <p:nvSpPr>
-          <p:cNvPr id="29" name="正方形/長方形 28"/>
+          <p:cNvPr id="71" name="正方形/長方形 70"/>
           <p:cNvSpPr/>
           <p:nvPr/>
         </p:nvSpPr>
         <p:spPr>
           <a:xfrm>
-            <a:off x="2051720" y="3356992"/>
+            <a:off x="980728" y="6753200"/>
             <a:ext cx="1531188" cy="338554"/>
           </a:xfrm>
           <a:prstGeom prst="rect">
@@ -4413,13 +5183,13 @@
       </p:sp>
       <p:sp>
         <p:nvSpPr>
-          <p:cNvPr id="22" name="右矢印 21"/>
+          <p:cNvPr id="72" name="右矢印 71"/>
           <p:cNvSpPr/>
           <p:nvPr/>
         </p:nvSpPr>
         <p:spPr>
           <a:xfrm>
-            <a:off x="3059832" y="2996952"/>
+            <a:off x="1988840" y="6393161"/>
             <a:ext cx="720080" cy="504056"/>
           </a:xfrm>
           <a:prstGeom prst="rightArrow">
@@ -4456,13 +5226,13 @@
       </p:sp>
       <p:sp>
         <p:nvSpPr>
-          <p:cNvPr id="23" name="右矢印 22"/>
+          <p:cNvPr id="73" name="右矢印 72"/>
           <p:cNvSpPr/>
           <p:nvPr/>
         </p:nvSpPr>
         <p:spPr>
           <a:xfrm>
-            <a:off x="4788024" y="2996952"/>
+            <a:off x="3717032" y="6393161"/>
             <a:ext cx="720080" cy="504056"/>
           </a:xfrm>
           <a:prstGeom prst="rightArrow">
@@ -4499,13 +5269,13 @@
       </p:sp>
       <p:cxnSp>
         <p:nvCxnSpPr>
-          <p:cNvPr id="31" name="直線矢印コネクタ 30"/>
+          <p:cNvPr id="74" name="直線矢印コネクタ 73"/>
           <p:cNvCxnSpPr/>
           <p:nvPr/>
         </p:nvCxnSpPr>
         <p:spPr>
           <a:xfrm rot="5400000">
-            <a:off x="6228184" y="3212976"/>
+            <a:off x="5157192" y="6609184"/>
             <a:ext cx="1728192" cy="1588"/>
           </a:xfrm>
           <a:prstGeom prst="straightConnector1">
@@ -4536,13 +5306,13 @@
       </p:cxnSp>
       <p:cxnSp>
         <p:nvCxnSpPr>
-          <p:cNvPr id="32" name="直線矢印コネクタ 31"/>
+          <p:cNvPr id="75" name="直線矢印コネクタ 74"/>
           <p:cNvCxnSpPr/>
           <p:nvPr/>
         </p:nvCxnSpPr>
         <p:spPr>
           <a:xfrm rot="10800000">
-            <a:off x="3419872" y="5949280"/>
+            <a:off x="2348881" y="9345489"/>
             <a:ext cx="1729780" cy="1588"/>
           </a:xfrm>
           <a:prstGeom prst="straightConnector1">
@@ -4573,13 +5343,13 @@
       </p:cxnSp>
       <p:sp>
         <p:nvSpPr>
-          <p:cNvPr id="34" name="正方形/長方形 33"/>
+          <p:cNvPr id="76" name="正方形/長方形 75"/>
           <p:cNvSpPr/>
           <p:nvPr/>
         </p:nvSpPr>
         <p:spPr>
           <a:xfrm>
-            <a:off x="7086388" y="2996952"/>
+            <a:off x="6015396" y="6393160"/>
             <a:ext cx="437940" cy="369332"/>
           </a:xfrm>
           <a:prstGeom prst="rect">
@@ -4604,13 +5374,13 @@
       </p:sp>
       <p:sp>
         <p:nvSpPr>
-          <p:cNvPr id="35" name="正方形/長方形 34"/>
+          <p:cNvPr id="77" name="正方形/長方形 76"/>
           <p:cNvSpPr/>
           <p:nvPr/>
         </p:nvSpPr>
         <p:spPr>
           <a:xfrm>
-            <a:off x="3990044" y="5939988"/>
+            <a:off x="2919052" y="9336196"/>
             <a:ext cx="437940" cy="369332"/>
           </a:xfrm>
           <a:prstGeom prst="rect">

</xml_diff>